<commit_message>
added couts in count lambdas and hrvs
</commit_message>
<xml_diff>
--- a/CausetPosterSketch.pptx
+++ b/CausetPosterSketch.pptx
@@ -125,12 +125,12 @@
   <pc:docChgLst>
     <pc:chgData name="Veroni, Stefano" userId="c6a0b827-0823-4cdd-9f2f-b443de65f065" providerId="ADAL" clId="{6A032B2E-AF7B-49EB-A97C-5A96FBC83131}"/>
     <pc:docChg chg="undo custSel addSld delSld modSld">
-      <pc:chgData name="Veroni, Stefano" userId="c6a0b827-0823-4cdd-9f2f-b443de65f065" providerId="ADAL" clId="{6A032B2E-AF7B-49EB-A97C-5A96FBC83131}" dt="2023-02-20T11:48:33.637" v="798" actId="20577"/>
+      <pc:chgData name="Veroni, Stefano" userId="c6a0b827-0823-4cdd-9f2f-b443de65f065" providerId="ADAL" clId="{6A032B2E-AF7B-49EB-A97C-5A96FBC83131}" dt="2023-02-20T12:09:00.596" v="839" actId="20577"/>
       <pc:docMkLst>
         <pc:docMk/>
       </pc:docMkLst>
       <pc:sldChg chg="addSp delSp modSp mod">
-        <pc:chgData name="Veroni, Stefano" userId="c6a0b827-0823-4cdd-9f2f-b443de65f065" providerId="ADAL" clId="{6A032B2E-AF7B-49EB-A97C-5A96FBC83131}" dt="2023-02-20T11:48:33.637" v="798" actId="20577"/>
+        <pc:chgData name="Veroni, Stefano" userId="c6a0b827-0823-4cdd-9f2f-b443de65f065" providerId="ADAL" clId="{6A032B2E-AF7B-49EB-A97C-5A96FBC83131}" dt="2023-02-20T12:09:00.596" v="839" actId="20577"/>
         <pc:sldMkLst>
           <pc:docMk/>
           <pc:sldMk cId="2250297410" sldId="256"/>
@@ -181,6 +181,14 @@
             <pc:docMk/>
             <pc:sldMk cId="2250297410" sldId="256"/>
             <ac:spMk id="7" creationId="{363CAB31-3B82-3EDC-74F8-553D3F425A55}"/>
+          </ac:spMkLst>
+        </pc:spChg>
+        <pc:spChg chg="mod">
+          <ac:chgData name="Veroni, Stefano" userId="c6a0b827-0823-4cdd-9f2f-b443de65f065" providerId="ADAL" clId="{6A032B2E-AF7B-49EB-A97C-5A96FBC83131}" dt="2023-02-20T12:09:00.596" v="839" actId="20577"/>
+          <ac:spMkLst>
+            <pc:docMk/>
+            <pc:sldMk cId="2250297410" sldId="256"/>
+            <ac:spMk id="8" creationId="{46E9196D-D196-308F-EEE4-93CEAB07ACA8}"/>
           </ac:spMkLst>
         </pc:spChg>
         <pc:spChg chg="add mod">
@@ -328,7 +336,7 @@
           </ac:spMkLst>
         </pc:spChg>
         <pc:spChg chg="mod">
-          <ac:chgData name="Veroni, Stefano" userId="c6a0b827-0823-4cdd-9f2f-b443de65f065" providerId="ADAL" clId="{6A032B2E-AF7B-49EB-A97C-5A96FBC83131}" dt="2023-02-20T11:33:48.132" v="243" actId="1076"/>
+          <ac:chgData name="Veroni, Stefano" userId="c6a0b827-0823-4cdd-9f2f-b443de65f065" providerId="ADAL" clId="{6A032B2E-AF7B-49EB-A97C-5A96FBC83131}" dt="2023-02-20T12:07:36.818" v="799" actId="1076"/>
           <ac:spMkLst>
             <pc:docMk/>
             <pc:sldMk cId="2250297410" sldId="256"/>
@@ -4045,8 +4053,8 @@
         </p:nvSpPr>
         <p:spPr>
           <a:xfrm>
-            <a:off x="10424037" y="72272"/>
-            <a:ext cx="10959590" cy="1441724"/>
+            <a:off x="10424037" y="72271"/>
+            <a:ext cx="10959590" cy="2632971"/>
           </a:xfrm>
           <a:prstGeom prst="rect">
             <a:avLst/>
@@ -4102,6 +4110,17 @@
             </a:r>
             <a:endParaRPr lang="en-GB" sz="4158" dirty="0"/>
           </a:p>
+          <a:p>
+            <a:pPr algn="r"/>
+            <a:r>
+              <a:rPr lang="en-GB" sz="4158" dirty="0"/>
+              <a:t>Research Group: Theoretical Physics</a:t>
+            </a:r>
+          </a:p>
+          <a:p>
+            <a:pPr algn="r"/>
+            <a:endParaRPr lang="en-GB" sz="4158" dirty="0"/>
+          </a:p>
         </p:txBody>
       </p:sp>
       <p:sp>
@@ -4364,8 +4383,8 @@
           </a:p>
         </p:txBody>
       </p:sp>
-      <mc:AlternateContent xmlns:mc="http://schemas.openxmlformats.org/markup-compatibility/2006">
-        <mc:Choice xmlns:p14="http://schemas.microsoft.com/office/powerpoint/2010/main" Requires="p14">
+      <mc:AlternateContent xmlns:mc="http://schemas.openxmlformats.org/markup-compatibility/2006" xmlns:p14="http://schemas.microsoft.com/office/powerpoint/2010/main">
+        <mc:Choice Requires="p14">
           <p:contentPart p14:bwMode="auto" r:id="rId2">
             <p14:nvContentPartPr>
               <p14:cNvPr id="27" name="Ink 26">
@@ -4384,7 +4403,7 @@
             </p14:xfrm>
           </p:contentPart>
         </mc:Choice>
-        <mc:Fallback>
+        <mc:Fallback xmlns="">
           <p:pic>
             <p:nvPicPr>
               <p:cNvPr id="27" name="Ink 26">
@@ -4415,8 +4434,8 @@
           </p:pic>
         </mc:Fallback>
       </mc:AlternateContent>
-      <mc:AlternateContent xmlns:mc="http://schemas.openxmlformats.org/markup-compatibility/2006">
-        <mc:Choice xmlns:p14="http://schemas.microsoft.com/office/powerpoint/2010/main" Requires="p14">
+      <mc:AlternateContent xmlns:mc="http://schemas.openxmlformats.org/markup-compatibility/2006" xmlns:p14="http://schemas.microsoft.com/office/powerpoint/2010/main">
+        <mc:Choice Requires="p14">
           <p:contentPart p14:bwMode="auto" r:id="rId4">
             <p14:nvContentPartPr>
               <p14:cNvPr id="28" name="Ink 27">
@@ -4435,7 +4454,7 @@
             </p14:xfrm>
           </p:contentPart>
         </mc:Choice>
-        <mc:Fallback>
+        <mc:Fallback xmlns="">
           <p:pic>
             <p:nvPicPr>
               <p:cNvPr id="28" name="Ink 27">
@@ -5094,7 +5113,7 @@
         </p:nvSpPr>
         <p:spPr>
           <a:xfrm>
-            <a:off x="344871" y="7237683"/>
+            <a:off x="568277" y="7237683"/>
             <a:ext cx="5785750" cy="4205767"/>
           </a:xfrm>
           <a:prstGeom prst="rect">
@@ -5189,8 +5208,8 @@
           </a:p>
         </p:txBody>
       </p:sp>
-      <mc:AlternateContent xmlns:mc="http://schemas.openxmlformats.org/markup-compatibility/2006">
-        <mc:Choice xmlns:p14="http://schemas.microsoft.com/office/powerpoint/2010/main" Requires="p14">
+      <mc:AlternateContent xmlns:mc="http://schemas.openxmlformats.org/markup-compatibility/2006" xmlns:p14="http://schemas.microsoft.com/office/powerpoint/2010/main">
+        <mc:Choice Requires="p14">
           <p:contentPart p14:bwMode="auto" r:id="rId5">
             <p14:nvContentPartPr>
               <p14:cNvPr id="60" name="Ink 59">
@@ -5209,7 +5228,7 @@
             </p14:xfrm>
           </p:contentPart>
         </mc:Choice>
-        <mc:Fallback>
+        <mc:Fallback xmlns="">
           <p:pic>
             <p:nvPicPr>
               <p:cNvPr id="60" name="Ink 59">
@@ -5240,8 +5259,8 @@
           </p:pic>
         </mc:Fallback>
       </mc:AlternateContent>
-      <mc:AlternateContent xmlns:mc="http://schemas.openxmlformats.org/markup-compatibility/2006">
-        <mc:Choice xmlns:p14="http://schemas.microsoft.com/office/powerpoint/2010/main" Requires="p14">
+      <mc:AlternateContent xmlns:mc="http://schemas.openxmlformats.org/markup-compatibility/2006" xmlns:p14="http://schemas.microsoft.com/office/powerpoint/2010/main">
+        <mc:Choice Requires="p14">
           <p:contentPart p14:bwMode="auto" r:id="rId7">
             <p14:nvContentPartPr>
               <p14:cNvPr id="61" name="Ink 60">
@@ -5260,7 +5279,7 @@
             </p14:xfrm>
           </p:contentPart>
         </mc:Choice>
-        <mc:Fallback>
+        <mc:Fallback xmlns="">
           <p:pic>
             <p:nvPicPr>
               <p:cNvPr id="61" name="Ink 60">
@@ -5291,8 +5310,8 @@
           </p:pic>
         </mc:Fallback>
       </mc:AlternateContent>
-      <mc:AlternateContent xmlns:mc="http://schemas.openxmlformats.org/markup-compatibility/2006">
-        <mc:Choice xmlns:p14="http://schemas.microsoft.com/office/powerpoint/2010/main" Requires="p14">
+      <mc:AlternateContent xmlns:mc="http://schemas.openxmlformats.org/markup-compatibility/2006" xmlns:p14="http://schemas.microsoft.com/office/powerpoint/2010/main">
+        <mc:Choice Requires="p14">
           <p:contentPart p14:bwMode="auto" r:id="rId8">
             <p14:nvContentPartPr>
               <p14:cNvPr id="62" name="Ink 61">
@@ -5311,7 +5330,7 @@
             </p14:xfrm>
           </p:contentPart>
         </mc:Choice>
-        <mc:Fallback>
+        <mc:Fallback xmlns="">
           <p:pic>
             <p:nvPicPr>
               <p:cNvPr id="62" name="Ink 61">
@@ -5342,8 +5361,8 @@
           </p:pic>
         </mc:Fallback>
       </mc:AlternateContent>
-      <mc:AlternateContent xmlns:mc="http://schemas.openxmlformats.org/markup-compatibility/2006">
-        <mc:Choice xmlns:p14="http://schemas.microsoft.com/office/powerpoint/2010/main" Requires="p14">
+      <mc:AlternateContent xmlns:mc="http://schemas.openxmlformats.org/markup-compatibility/2006" xmlns:p14="http://schemas.microsoft.com/office/powerpoint/2010/main">
+        <mc:Choice Requires="p14">
           <p:contentPart p14:bwMode="auto" r:id="rId9">
             <p14:nvContentPartPr>
               <p14:cNvPr id="75" name="Ink 74">
@@ -5362,7 +5381,7 @@
             </p14:xfrm>
           </p:contentPart>
         </mc:Choice>
-        <mc:Fallback>
+        <mc:Fallback xmlns="">
           <p:pic>
             <p:nvPicPr>
               <p:cNvPr id="75" name="Ink 74">
@@ -5393,8 +5412,8 @@
           </p:pic>
         </mc:Fallback>
       </mc:AlternateContent>
-      <mc:AlternateContent xmlns:mc="http://schemas.openxmlformats.org/markup-compatibility/2006">
-        <mc:Choice xmlns:p14="http://schemas.microsoft.com/office/powerpoint/2010/main" Requires="p14">
+      <mc:AlternateContent xmlns:mc="http://schemas.openxmlformats.org/markup-compatibility/2006" xmlns:p14="http://schemas.microsoft.com/office/powerpoint/2010/main">
+        <mc:Choice Requires="p14">
           <p:contentPart p14:bwMode="auto" r:id="rId10">
             <p14:nvContentPartPr>
               <p14:cNvPr id="77" name="Ink 76">
@@ -5413,7 +5432,7 @@
             </p14:xfrm>
           </p:contentPart>
         </mc:Choice>
-        <mc:Fallback>
+        <mc:Fallback xmlns="">
           <p:pic>
             <p:nvPicPr>
               <p:cNvPr id="77" name="Ink 76">
@@ -5444,8 +5463,8 @@
           </p:pic>
         </mc:Fallback>
       </mc:AlternateContent>
-      <mc:AlternateContent xmlns:mc="http://schemas.openxmlformats.org/markup-compatibility/2006">
-        <mc:Choice xmlns:p14="http://schemas.microsoft.com/office/powerpoint/2010/main" Requires="p14">
+      <mc:AlternateContent xmlns:mc="http://schemas.openxmlformats.org/markup-compatibility/2006" xmlns:p14="http://schemas.microsoft.com/office/powerpoint/2010/main">
+        <mc:Choice Requires="p14">
           <p:contentPart p14:bwMode="auto" r:id="rId11">
             <p14:nvContentPartPr>
               <p14:cNvPr id="78" name="Ink 77">
@@ -5464,7 +5483,7 @@
             </p14:xfrm>
           </p:contentPart>
         </mc:Choice>
-        <mc:Fallback>
+        <mc:Fallback xmlns="">
           <p:pic>
             <p:nvPicPr>
               <p:cNvPr id="78" name="Ink 77">
@@ -5495,8 +5514,8 @@
           </p:pic>
         </mc:Fallback>
       </mc:AlternateContent>
-      <mc:AlternateContent xmlns:mc="http://schemas.openxmlformats.org/markup-compatibility/2006">
-        <mc:Choice xmlns:p14="http://schemas.microsoft.com/office/powerpoint/2010/main" Requires="p14">
+      <mc:AlternateContent xmlns:mc="http://schemas.openxmlformats.org/markup-compatibility/2006" xmlns:p14="http://schemas.microsoft.com/office/powerpoint/2010/main">
+        <mc:Choice Requires="p14">
           <p:contentPart p14:bwMode="auto" r:id="rId12">
             <p14:nvContentPartPr>
               <p14:cNvPr id="79" name="Ink 78">
@@ -5515,7 +5534,7 @@
             </p14:xfrm>
           </p:contentPart>
         </mc:Choice>
-        <mc:Fallback>
+        <mc:Fallback xmlns="">
           <p:pic>
             <p:nvPicPr>
               <p:cNvPr id="79" name="Ink 78">
@@ -5546,8 +5565,8 @@
           </p:pic>
         </mc:Fallback>
       </mc:AlternateContent>
-      <mc:AlternateContent xmlns:mc="http://schemas.openxmlformats.org/markup-compatibility/2006">
-        <mc:Choice xmlns:p14="http://schemas.microsoft.com/office/powerpoint/2010/main" Requires="p14">
+      <mc:AlternateContent xmlns:mc="http://schemas.openxmlformats.org/markup-compatibility/2006" xmlns:p14="http://schemas.microsoft.com/office/powerpoint/2010/main">
+        <mc:Choice Requires="p14">
           <p:contentPart p14:bwMode="auto" r:id="rId13">
             <p14:nvContentPartPr>
               <p14:cNvPr id="86" name="Ink 85">
@@ -5566,7 +5585,7 @@
             </p14:xfrm>
           </p:contentPart>
         </mc:Choice>
-        <mc:Fallback>
+        <mc:Fallback xmlns="">
           <p:pic>
             <p:nvPicPr>
               <p:cNvPr id="86" name="Ink 85">
@@ -5924,8 +5943,8 @@
           </mc:Fallback>
         </mc:AlternateContent>
       </p:grpSp>
-      <mc:AlternateContent xmlns:mc="http://schemas.openxmlformats.org/markup-compatibility/2006">
-        <mc:Choice xmlns:p14="http://schemas.microsoft.com/office/powerpoint/2010/main" Requires="p14">
+      <mc:AlternateContent xmlns:mc="http://schemas.openxmlformats.org/markup-compatibility/2006" xmlns:p14="http://schemas.microsoft.com/office/powerpoint/2010/main">
+        <mc:Choice Requires="p14">
           <p:contentPart p14:bwMode="auto" r:id="rId26">
             <p14:nvContentPartPr>
               <p14:cNvPr id="90" name="Ink 89">
@@ -5944,7 +5963,7 @@
             </p14:xfrm>
           </p:contentPart>
         </mc:Choice>
-        <mc:Fallback>
+        <mc:Fallback xmlns="">
           <p:pic>
             <p:nvPicPr>
               <p:cNvPr id="90" name="Ink 89">

</xml_diff>